<commit_message>
UI Updates such as Message Labels
</commit_message>
<xml_diff>
--- a/7. Group Project/W6D5_Project/PPT/Watch Me Whip.pptx
+++ b/7. Group Project/W6D5_Project/PPT/Watch Me Whip.pptx
@@ -4189,6 +4189,13 @@
   <p:clrMapOvr>
     <a:masterClrMapping/>
   </p:clrMapOvr>
+  <p:timing>
+    <p:tnLst>
+      <p:par>
+        <p:cTn id="1" dur="indefinite" restart="never" nodeType="tmRoot"/>
+      </p:par>
+    </p:tnLst>
+  </p:timing>
 </p:sld>
 </file>
 
@@ -4329,6 +4336,13 @@
   <p:clrMapOvr>
     <a:masterClrMapping/>
   </p:clrMapOvr>
+  <p:timing>
+    <p:tnLst>
+      <p:par>
+        <p:cTn id="1" dur="indefinite" restart="never" nodeType="tmRoot"/>
+      </p:par>
+    </p:tnLst>
+  </p:timing>
 </p:sld>
 </file>
 
@@ -4398,7 +4412,6 @@
               <a:rPr lang="en-US" dirty="0" smtClean="0"/>
               <a:t>Favorite items list (only indicator in UI)</a:t>
             </a:r>
-            <a:endParaRPr lang="en-US" dirty="0" smtClean="0"/>
           </a:p>
           <a:p>
             <a:pPr lvl="1"/>
@@ -4414,6 +4427,13 @@
   <p:clrMapOvr>
     <a:masterClrMapping/>
   </p:clrMapOvr>
+  <p:timing>
+    <p:tnLst>
+      <p:par>
+        <p:cTn id="1" dur="indefinite" restart="never" nodeType="tmRoot"/>
+      </p:par>
+    </p:tnLst>
+  </p:timing>
 </p:sld>
 </file>
 
@@ -4481,6 +4501,13 @@
   <p:clrMapOvr>
     <a:masterClrMapping/>
   </p:clrMapOvr>
+  <p:timing>
+    <p:tnLst>
+      <p:par>
+        <p:cTn id="1" dur="indefinite" restart="never" nodeType="tmRoot"/>
+      </p:par>
+    </p:tnLst>
+  </p:timing>
 </p:sld>
 </file>
 
@@ -4548,6 +4575,13 @@
   <p:clrMapOvr>
     <a:masterClrMapping/>
   </p:clrMapOvr>
+  <p:timing>
+    <p:tnLst>
+      <p:par>
+        <p:cTn id="1" dur="indefinite" restart="never" nodeType="tmRoot"/>
+      </p:par>
+    </p:tnLst>
+  </p:timing>
 </p:sld>
 </file>
 
@@ -4858,7 +4892,9 @@
         </p:nvSpPr>
         <p:spPr/>
         <p:txBody>
-          <a:bodyPr/>
+          <a:bodyPr>
+            <a:normAutofit lnSpcReduction="10000"/>
+          </a:bodyPr>
           <a:lstStyle/>
           <a:p>
             <a:r>
@@ -4898,10 +4934,9 @@
           </a:p>
           <a:p>
             <a:r>
-              <a:rPr lang="en-US" smtClean="0"/>
+              <a:rPr lang="en-US" dirty="0" smtClean="0"/>
               <a:t>Password Hash</a:t>
             </a:r>
-            <a:endParaRPr lang="en-US" dirty="0" smtClean="0"/>
           </a:p>
           <a:p>
             <a:r>
@@ -4915,6 +4950,17 @@
             <a:endParaRPr lang="en-US" dirty="0" smtClean="0"/>
           </a:p>
           <a:p>
+            <a:r>
+              <a:rPr lang="en-US" dirty="0" err="1" smtClean="0"/>
+              <a:t>ExtJS</a:t>
+            </a:r>
+            <a:endParaRPr lang="en-US" dirty="0" smtClean="0"/>
+          </a:p>
+          <a:p>
+            <a:r>
+              <a:rPr lang="en-US" dirty="0" err="1" smtClean="0"/>
+              <a:t>GenericDAO</a:t>
+            </a:r>
             <a:endParaRPr lang="en-US" dirty="0"/>
           </a:p>
         </p:txBody>

</xml_diff>